<commit_message>
Replaced Neooffice generated docs with MacOffice 2008 generated docs. Neooffice makes incorrect openxml docs.
</commit_message>
<xml_diff>
--- a/tests/in/presentation1.pptx
+++ b/tests/in/presentation1.pptx
@@ -1,16 +1,15 @@
 
 <file path=ppt/presentation.xml><?xml version="1.0" encoding="utf-8"?>
-<p:presentation xmlns:p="http://schemas.openxmlformats.org/presentationml/2006/main" xmlns="http://schemas.openxmlformats.org/package/2006/relationships" xmlns:r="http://schemas.openxmlformats.org/officeDocument/2006/relationships" xmlns:table="urn:oasis:names:tc:opendocument:xmlns:table:1.0" xmlns:fo="urn:oasis:names:tc:opendocument:xmlns:xsl-fo-compatible:1.0" xmlns:svg="urn:oasis:names:tc:opendocument:xmlns:svg-compatible:1.0" xmlns:presentation="urn:oasis:names:tc:opendocument:xmlns:presentation:1.0" xmlns:a="http://schemas.openxmlformats.org/drawingml/2006/main">
+<p:presentation xmlns:a="http://schemas.openxmlformats.org/drawingml/2006/main" xmlns:r="http://schemas.openxmlformats.org/officeDocument/2006/relationships" xmlns:mc="http://schemas.openxmlformats.org/markup-compatibility/2006" xmlns:mv="urn:schemas-microsoft-com:mac:vml" xmlns:p="http://schemas.openxmlformats.org/presentationml/2006/main" mc:Ignorable="mv" mc:PreserveAttributes="mv:*">
   <p:sldMasterIdLst>
-    <p:sldMasterId id="2147483648" r:id="smId1"/>
+    <p:sldMasterId id="2147483648" r:id="rId1"/>
   </p:sldMasterIdLst>
   <p:sldIdLst>
-    <p:sldId id="256" r:id="sId1"/>
-    <p:sldId id="257" r:id="sId2"/>
+    <p:sldId id="256" r:id="rId2"/>
+    <p:sldId id="257" r:id="rId3"/>
   </p:sldIdLst>
-  <p:sldSz cx="10080000" cy="7560000"/>
-  <p:notesSz cx="7560000" cy="10692000"/>
-  <p:custShowLst/>
+  <p:sldSz cx="10080625" cy="7559675"/>
+  <p:notesSz cx="7559675" cy="10691813"/>
   <p:defaultTextStyle>
     <a:defPPr>
       <a:defRPr lang="en-US"/>
@@ -110,7 +109,7 @@
 </file>
 
 <file path=ppt/slideLayouts/slideLayout1.xml><?xml version="1.0" encoding="utf-8"?>
-<p:sldLayout xmlns:p="http://schemas.openxmlformats.org/presentationml/2006/main" xmlns:r="http://schemas.openxmlformats.org/officeDocument/2006/relationships" xmlns:a="http://schemas.openxmlformats.org/drawingml/2006/main" type="title" preserve="1">
+<p:sldLayout xmlns:a="http://schemas.openxmlformats.org/drawingml/2006/main" xmlns:r="http://schemas.openxmlformats.org/officeDocument/2006/relationships" xmlns:mc="http://schemas.openxmlformats.org/markup-compatibility/2006" xmlns:mv="urn:schemas-microsoft-com:mac:vml" xmlns:p="http://schemas.openxmlformats.org/presentationml/2006/main" mc:Ignorable="mv" mc:PreserveAttributes="mv:*" type="title" preserve="1">
   <p:cSld name="Title Slide">
     <p:spTree>
       <p:nvGrpSpPr>
@@ -290,7 +289,8 @@
           <a:p>
             <a:fld id="{11859447-1FF1-4571-A7A1-75F1CAF7F5D9}" type="datetime1">
               <a:rPr lang="en-US" smtClean="0"/>
-              <a:t/>
+              <a:pPr/>
+              <a:t>19/11/08</a:t>
             </a:fld>
             <a:endParaRPr lang="en-US"/>
           </a:p>
@@ -311,10 +311,6 @@
           <a:bodyPr/>
           <a:lstStyle/>
           <a:p>
-            <a:r>
-              <a:rPr lang="en-US" dirty="0" smtClean="0"/>
-              <a:t/>
-            </a:r>
             <a:endParaRPr lang="en-US"/>
           </a:p>
         </p:txBody>
@@ -336,7 +332,8 @@
           <a:p>
             <a:fld id="{763D1470-AB83-4C4C-B3B3-7F0C9DC8E8D6}" type="slidenum">
               <a:rPr lang="en-US" smtClean="0"/>
-              <a:t>&lt;numéro&gt;</a:t>
+              <a:pPr/>
+              <a:t>‹#›</a:t>
             </a:fld>
             <a:endParaRPr lang="en-US"/>
           </a:p>
@@ -351,7 +348,7 @@
 </file>
 
 <file path=ppt/slideLayouts/slideLayout10.xml><?xml version="1.0" encoding="utf-8"?>
-<p:sldLayout xmlns:p="http://schemas.openxmlformats.org/presentationml/2006/main" xmlns:r="http://schemas.openxmlformats.org/officeDocument/2006/relationships" xmlns:a="http://schemas.openxmlformats.org/drawingml/2006/main" type="vertTx" preserve="1">
+<p:sldLayout xmlns:a="http://schemas.openxmlformats.org/drawingml/2006/main" xmlns:r="http://schemas.openxmlformats.org/officeDocument/2006/relationships" xmlns:mc="http://schemas.openxmlformats.org/markup-compatibility/2006" xmlns:mv="urn:schemas-microsoft-com:mac:vml" xmlns:p="http://schemas.openxmlformats.org/presentationml/2006/main" mc:Ignorable="mv" mc:PreserveAttributes="mv:*" type="vertTx" preserve="1">
   <p:cSld name="Title and Vertical Text">
     <p:spTree>
       <p:nvGrpSpPr>
@@ -459,7 +456,8 @@
           <a:p>
             <a:fld id="{11859447-1FF1-4571-A7A1-75F1CAF7F5D9}" type="datetime1">
               <a:rPr lang="en-US" smtClean="0"/>
-              <a:t/>
+              <a:pPr/>
+              <a:t>19/11/08</a:t>
             </a:fld>
             <a:endParaRPr lang="en-US"/>
           </a:p>
@@ -480,10 +478,6 @@
           <a:bodyPr/>
           <a:lstStyle/>
           <a:p>
-            <a:r>
-              <a:rPr lang="en-US" dirty="0" smtClean="0"/>
-              <a:t/>
-            </a:r>
             <a:endParaRPr lang="en-US"/>
           </a:p>
         </p:txBody>
@@ -505,7 +499,8 @@
           <a:p>
             <a:fld id="{763D1470-AB83-4C4C-B3B3-7F0C9DC8E8D6}" type="slidenum">
               <a:rPr lang="en-US" smtClean="0"/>
-              <a:t>&lt;numéro&gt;</a:t>
+              <a:pPr/>
+              <a:t>‹#›</a:t>
             </a:fld>
             <a:endParaRPr lang="en-US"/>
           </a:p>
@@ -520,7 +515,7 @@
 </file>
 
 <file path=ppt/slideLayouts/slideLayout11.xml><?xml version="1.0" encoding="utf-8"?>
-<p:sldLayout xmlns:p="http://schemas.openxmlformats.org/presentationml/2006/main" xmlns:r="http://schemas.openxmlformats.org/officeDocument/2006/relationships" xmlns:a="http://schemas.openxmlformats.org/drawingml/2006/main" type="vertTitleAndTx" preserve="1">
+<p:sldLayout xmlns:a="http://schemas.openxmlformats.org/drawingml/2006/main" xmlns:r="http://schemas.openxmlformats.org/officeDocument/2006/relationships" xmlns:mc="http://schemas.openxmlformats.org/markup-compatibility/2006" xmlns:mv="urn:schemas-microsoft-com:mac:vml" xmlns:p="http://schemas.openxmlformats.org/presentationml/2006/main" mc:Ignorable="mv" mc:PreserveAttributes="mv:*" type="vertTitleAndTx" preserve="1">
   <p:cSld name="Vertical Title and Text">
     <p:spTree>
       <p:nvGrpSpPr>
@@ -638,7 +633,8 @@
           <a:p>
             <a:fld id="{11859447-1FF1-4571-A7A1-75F1CAF7F5D9}" type="datetime1">
               <a:rPr lang="en-US" smtClean="0"/>
-              <a:t/>
+              <a:pPr/>
+              <a:t>19/11/08</a:t>
             </a:fld>
             <a:endParaRPr lang="en-US"/>
           </a:p>
@@ -659,10 +655,6 @@
           <a:bodyPr/>
           <a:lstStyle/>
           <a:p>
-            <a:r>
-              <a:rPr lang="en-US" dirty="0" smtClean="0"/>
-              <a:t/>
-            </a:r>
             <a:endParaRPr lang="en-US"/>
           </a:p>
         </p:txBody>
@@ -684,7 +676,8 @@
           <a:p>
             <a:fld id="{763D1470-AB83-4C4C-B3B3-7F0C9DC8E8D6}" type="slidenum">
               <a:rPr lang="en-US" smtClean="0"/>
-              <a:t>&lt;numéro&gt;</a:t>
+              <a:pPr/>
+              <a:t>‹#›</a:t>
             </a:fld>
             <a:endParaRPr lang="en-US"/>
           </a:p>
@@ -699,7 +692,7 @@
 </file>
 
 <file path=ppt/slideLayouts/slideLayout2.xml><?xml version="1.0" encoding="utf-8"?>
-<p:sldLayout xmlns:p="http://schemas.openxmlformats.org/presentationml/2006/main" xmlns:r="http://schemas.openxmlformats.org/officeDocument/2006/relationships" xmlns:a="http://schemas.openxmlformats.org/drawingml/2006/main" type="obj" preserve="1">
+<p:sldLayout xmlns:a="http://schemas.openxmlformats.org/drawingml/2006/main" xmlns:r="http://schemas.openxmlformats.org/officeDocument/2006/relationships" xmlns:mc="http://schemas.openxmlformats.org/markup-compatibility/2006" xmlns:mv="urn:schemas-microsoft-com:mac:vml" xmlns:p="http://schemas.openxmlformats.org/presentationml/2006/main" mc:Ignorable="mv" mc:PreserveAttributes="mv:*" type="obj" preserve="1">
   <p:cSld name="Title and Content">
     <p:spTree>
       <p:nvGrpSpPr>
@@ -807,7 +800,8 @@
           <a:p>
             <a:fld id="{11859447-1FF1-4571-A7A1-75F1CAF7F5D9}" type="datetime1">
               <a:rPr lang="en-US" smtClean="0"/>
-              <a:t/>
+              <a:pPr/>
+              <a:t>19/11/08</a:t>
             </a:fld>
             <a:endParaRPr lang="en-US"/>
           </a:p>
@@ -828,10 +822,6 @@
           <a:bodyPr/>
           <a:lstStyle/>
           <a:p>
-            <a:r>
-              <a:rPr lang="en-US" dirty="0" smtClean="0"/>
-              <a:t/>
-            </a:r>
             <a:endParaRPr lang="en-US"/>
           </a:p>
         </p:txBody>
@@ -853,7 +843,8 @@
           <a:p>
             <a:fld id="{763D1470-AB83-4C4C-B3B3-7F0C9DC8E8D6}" type="slidenum">
               <a:rPr lang="en-US" smtClean="0"/>
-              <a:t>&lt;numéro&gt;</a:t>
+              <a:pPr/>
+              <a:t>‹#›</a:t>
             </a:fld>
             <a:endParaRPr lang="en-US"/>
           </a:p>
@@ -868,7 +859,7 @@
 </file>
 
 <file path=ppt/slideLayouts/slideLayout3.xml><?xml version="1.0" encoding="utf-8"?>
-<p:sldLayout xmlns:p="http://schemas.openxmlformats.org/presentationml/2006/main" xmlns:r="http://schemas.openxmlformats.org/officeDocument/2006/relationships" xmlns:a="http://schemas.openxmlformats.org/drawingml/2006/main" type="secHead" preserve="1">
+<p:sldLayout xmlns:a="http://schemas.openxmlformats.org/drawingml/2006/main" xmlns:r="http://schemas.openxmlformats.org/officeDocument/2006/relationships" xmlns:mc="http://schemas.openxmlformats.org/markup-compatibility/2006" xmlns:mv="urn:schemas-microsoft-com:mac:vml" xmlns:p="http://schemas.openxmlformats.org/presentationml/2006/main" mc:Ignorable="mv" mc:PreserveAttributes="mv:*" type="secHead" preserve="1">
   <p:cSld name="Section Header">
     <p:spTree>
       <p:nvGrpSpPr>
@@ -1052,7 +1043,8 @@
           <a:p>
             <a:fld id="{11859447-1FF1-4571-A7A1-75F1CAF7F5D9}" type="datetime1">
               <a:rPr lang="en-US" smtClean="0"/>
-              <a:t/>
+              <a:pPr/>
+              <a:t>19/11/08</a:t>
             </a:fld>
             <a:endParaRPr lang="en-US"/>
           </a:p>
@@ -1073,10 +1065,6 @@
           <a:bodyPr/>
           <a:lstStyle/>
           <a:p>
-            <a:r>
-              <a:rPr lang="en-US" dirty="0" smtClean="0"/>
-              <a:t/>
-            </a:r>
             <a:endParaRPr lang="en-US"/>
           </a:p>
         </p:txBody>
@@ -1098,7 +1086,8 @@
           <a:p>
             <a:fld id="{763D1470-AB83-4C4C-B3B3-7F0C9DC8E8D6}" type="slidenum">
               <a:rPr lang="en-US" smtClean="0"/>
-              <a:t>&lt;numéro&gt;</a:t>
+              <a:pPr/>
+              <a:t>‹#›</a:t>
             </a:fld>
             <a:endParaRPr lang="en-US"/>
           </a:p>
@@ -1113,7 +1102,7 @@
 </file>
 
 <file path=ppt/slideLayouts/slideLayout4.xml><?xml version="1.0" encoding="utf-8"?>
-<p:sldLayout xmlns:p="http://schemas.openxmlformats.org/presentationml/2006/main" xmlns:r="http://schemas.openxmlformats.org/officeDocument/2006/relationships" xmlns:a="http://schemas.openxmlformats.org/drawingml/2006/main" type="twoObj" preserve="1">
+<p:sldLayout xmlns:a="http://schemas.openxmlformats.org/drawingml/2006/main" xmlns:r="http://schemas.openxmlformats.org/officeDocument/2006/relationships" xmlns:mc="http://schemas.openxmlformats.org/markup-compatibility/2006" xmlns:mv="urn:schemas-microsoft-com:mac:vml" xmlns:p="http://schemas.openxmlformats.org/presentationml/2006/main" mc:Ignorable="mv" mc:PreserveAttributes="mv:*" type="twoObj" preserve="1">
   <p:cSld name="Two Content">
     <p:spTree>
       <p:nvGrpSpPr>
@@ -1339,7 +1328,8 @@
           <a:p>
             <a:fld id="{11859447-1FF1-4571-A7A1-75F1CAF7F5D9}" type="datetime1">
               <a:rPr lang="en-US" smtClean="0"/>
-              <a:t/>
+              <a:pPr/>
+              <a:t>19/11/08</a:t>
             </a:fld>
             <a:endParaRPr lang="en-US"/>
           </a:p>
@@ -1360,10 +1350,6 @@
           <a:bodyPr/>
           <a:lstStyle/>
           <a:p>
-            <a:r>
-              <a:rPr lang="en-US" dirty="0" smtClean="0"/>
-              <a:t/>
-            </a:r>
             <a:endParaRPr lang="en-US"/>
           </a:p>
         </p:txBody>
@@ -1385,7 +1371,8 @@
           <a:p>
             <a:fld id="{763D1470-AB83-4C4C-B3B3-7F0C9DC8E8D6}" type="slidenum">
               <a:rPr lang="en-US" smtClean="0"/>
-              <a:t>&lt;numéro&gt;</a:t>
+              <a:pPr/>
+              <a:t>‹#›</a:t>
             </a:fld>
             <a:endParaRPr lang="en-US"/>
           </a:p>
@@ -1400,7 +1387,7 @@
 </file>
 
 <file path=ppt/slideLayouts/slideLayout5.xml><?xml version="1.0" encoding="utf-8"?>
-<p:sldLayout xmlns:p="http://schemas.openxmlformats.org/presentationml/2006/main" xmlns:r="http://schemas.openxmlformats.org/officeDocument/2006/relationships" xmlns:a="http://schemas.openxmlformats.org/drawingml/2006/main" type="twoTxTwoObj" preserve="1">
+<p:sldLayout xmlns:a="http://schemas.openxmlformats.org/drawingml/2006/main" xmlns:r="http://schemas.openxmlformats.org/officeDocument/2006/relationships" xmlns:mc="http://schemas.openxmlformats.org/markup-compatibility/2006" xmlns:mv="urn:schemas-microsoft-com:mac:vml" xmlns:p="http://schemas.openxmlformats.org/presentationml/2006/main" mc:Ignorable="mv" mc:PreserveAttributes="mv:*" type="twoTxTwoObj" preserve="1">
   <p:cSld name="Comparison">
     <p:spTree>
       <p:nvGrpSpPr>
@@ -1760,7 +1747,8 @@
           <a:p>
             <a:fld id="{11859447-1FF1-4571-A7A1-75F1CAF7F5D9}" type="datetime1">
               <a:rPr lang="en-US" smtClean="0"/>
-              <a:t/>
+              <a:pPr/>
+              <a:t>19/11/08</a:t>
             </a:fld>
             <a:endParaRPr lang="en-US"/>
           </a:p>
@@ -1781,10 +1769,6 @@
           <a:bodyPr/>
           <a:lstStyle/>
           <a:p>
-            <a:r>
-              <a:rPr lang="en-US" dirty="0" smtClean="0"/>
-              <a:t/>
-            </a:r>
             <a:endParaRPr lang="en-US"/>
           </a:p>
         </p:txBody>
@@ -1806,7 +1790,8 @@
           <a:p>
             <a:fld id="{763D1470-AB83-4C4C-B3B3-7F0C9DC8E8D6}" type="slidenum">
               <a:rPr lang="en-US" smtClean="0"/>
-              <a:t>&lt;numéro&gt;</a:t>
+              <a:pPr/>
+              <a:t>‹#›</a:t>
             </a:fld>
             <a:endParaRPr lang="en-US"/>
           </a:p>
@@ -1821,7 +1806,7 @@
 </file>
 
 <file path=ppt/slideLayouts/slideLayout6.xml><?xml version="1.0" encoding="utf-8"?>
-<p:sldLayout xmlns:p="http://schemas.openxmlformats.org/presentationml/2006/main" xmlns:r="http://schemas.openxmlformats.org/officeDocument/2006/relationships" xmlns:a="http://schemas.openxmlformats.org/drawingml/2006/main" type="titleOnly" preserve="1">
+<p:sldLayout xmlns:a="http://schemas.openxmlformats.org/drawingml/2006/main" xmlns:r="http://schemas.openxmlformats.org/officeDocument/2006/relationships" xmlns:mc="http://schemas.openxmlformats.org/markup-compatibility/2006" xmlns:mv="urn:schemas-microsoft-com:mac:vml" xmlns:p="http://schemas.openxmlformats.org/presentationml/2006/main" mc:Ignorable="mv" mc:PreserveAttributes="mv:*" type="titleOnly" preserve="1">
   <p:cSld name="Title Only">
     <p:spTree>
       <p:nvGrpSpPr>
@@ -1877,7 +1862,8 @@
           <a:p>
             <a:fld id="{11859447-1FF1-4571-A7A1-75F1CAF7F5D9}" type="datetime1">
               <a:rPr lang="en-US" smtClean="0"/>
-              <a:t/>
+              <a:pPr/>
+              <a:t>19/11/08</a:t>
             </a:fld>
             <a:endParaRPr lang="en-US"/>
           </a:p>
@@ -1898,10 +1884,6 @@
           <a:bodyPr/>
           <a:lstStyle/>
           <a:p>
-            <a:r>
-              <a:rPr lang="en-US" dirty="0" smtClean="0"/>
-              <a:t/>
-            </a:r>
             <a:endParaRPr lang="en-US"/>
           </a:p>
         </p:txBody>
@@ -1923,7 +1905,8 @@
           <a:p>
             <a:fld id="{763D1470-AB83-4C4C-B3B3-7F0C9DC8E8D6}" type="slidenum">
               <a:rPr lang="en-US" smtClean="0"/>
-              <a:t>&lt;numéro&gt;</a:t>
+              <a:pPr/>
+              <a:t>‹#›</a:t>
             </a:fld>
             <a:endParaRPr lang="en-US"/>
           </a:p>
@@ -1938,7 +1921,7 @@
 </file>
 
 <file path=ppt/slideLayouts/slideLayout7.xml><?xml version="1.0" encoding="utf-8"?>
-<p:sldLayout xmlns:p="http://schemas.openxmlformats.org/presentationml/2006/main" xmlns:r="http://schemas.openxmlformats.org/officeDocument/2006/relationships" xmlns:a="http://schemas.openxmlformats.org/drawingml/2006/main" type="blank" preserve="1">
+<p:sldLayout xmlns:a="http://schemas.openxmlformats.org/drawingml/2006/main" xmlns:r="http://schemas.openxmlformats.org/officeDocument/2006/relationships" xmlns:mc="http://schemas.openxmlformats.org/markup-compatibility/2006" xmlns:mv="urn:schemas-microsoft-com:mac:vml" xmlns:p="http://schemas.openxmlformats.org/presentationml/2006/main" mc:Ignorable="mv" mc:PreserveAttributes="mv:*" type="blank" preserve="1">
   <p:cSld name="Blank">
     <p:spTree>
       <p:nvGrpSpPr>
@@ -1971,7 +1954,8 @@
           <a:p>
             <a:fld id="{11859447-1FF1-4571-A7A1-75F1CAF7F5D9}" type="datetime1">
               <a:rPr lang="en-US" smtClean="0"/>
-              <a:t/>
+              <a:pPr/>
+              <a:t>19/11/08</a:t>
             </a:fld>
             <a:endParaRPr lang="en-US"/>
           </a:p>
@@ -1992,10 +1976,6 @@
           <a:bodyPr/>
           <a:lstStyle/>
           <a:p>
-            <a:r>
-              <a:rPr lang="en-US" dirty="0" smtClean="0"/>
-              <a:t/>
-            </a:r>
             <a:endParaRPr lang="en-US"/>
           </a:p>
         </p:txBody>
@@ -2017,7 +1997,8 @@
           <a:p>
             <a:fld id="{763D1470-AB83-4C4C-B3B3-7F0C9DC8E8D6}" type="slidenum">
               <a:rPr lang="en-US" smtClean="0"/>
-              <a:t>&lt;numéro&gt;</a:t>
+              <a:pPr/>
+              <a:t>‹#›</a:t>
             </a:fld>
             <a:endParaRPr lang="en-US"/>
           </a:p>
@@ -2032,7 +2013,7 @@
 </file>
 
 <file path=ppt/slideLayouts/slideLayout8.xml><?xml version="1.0" encoding="utf-8"?>
-<p:sldLayout xmlns:p="http://schemas.openxmlformats.org/presentationml/2006/main" xmlns:r="http://schemas.openxmlformats.org/officeDocument/2006/relationships" xmlns:a="http://schemas.openxmlformats.org/drawingml/2006/main" type="objTx" preserve="1">
+<p:sldLayout xmlns:a="http://schemas.openxmlformats.org/drawingml/2006/main" xmlns:r="http://schemas.openxmlformats.org/officeDocument/2006/relationships" xmlns:mc="http://schemas.openxmlformats.org/markup-compatibility/2006" xmlns:mv="urn:schemas-microsoft-com:mac:vml" xmlns:p="http://schemas.openxmlformats.org/presentationml/2006/main" mc:Ignorable="mv" mc:PreserveAttributes="mv:*" type="objTx" preserve="1">
   <p:cSld name="Content with Caption">
     <p:spTree>
       <p:nvGrpSpPr>
@@ -2247,7 +2228,8 @@
           <a:p>
             <a:fld id="{11859447-1FF1-4571-A7A1-75F1CAF7F5D9}" type="datetime1">
               <a:rPr lang="en-US" smtClean="0"/>
-              <a:t/>
+              <a:pPr/>
+              <a:t>19/11/08</a:t>
             </a:fld>
             <a:endParaRPr lang="en-US"/>
           </a:p>
@@ -2268,10 +2250,6 @@
           <a:bodyPr/>
           <a:lstStyle/>
           <a:p>
-            <a:r>
-              <a:rPr lang="en-US" dirty="0" smtClean="0"/>
-              <a:t/>
-            </a:r>
             <a:endParaRPr lang="en-US"/>
           </a:p>
         </p:txBody>
@@ -2293,7 +2271,8 @@
           <a:p>
             <a:fld id="{763D1470-AB83-4C4C-B3B3-7F0C9DC8E8D6}" type="slidenum">
               <a:rPr lang="en-US" smtClean="0"/>
-              <a:t>&lt;numéro&gt;</a:t>
+              <a:pPr/>
+              <a:t>‹#›</a:t>
             </a:fld>
             <a:endParaRPr lang="en-US"/>
           </a:p>
@@ -2308,7 +2287,7 @@
 </file>
 
 <file path=ppt/slideLayouts/slideLayout9.xml><?xml version="1.0" encoding="utf-8"?>
-<p:sldLayout xmlns:p="http://schemas.openxmlformats.org/presentationml/2006/main" xmlns:r="http://schemas.openxmlformats.org/officeDocument/2006/relationships" xmlns:a="http://schemas.openxmlformats.org/drawingml/2006/main" type="picTx" preserve="1">
+<p:sldLayout xmlns:a="http://schemas.openxmlformats.org/drawingml/2006/main" xmlns:r="http://schemas.openxmlformats.org/officeDocument/2006/relationships" xmlns:mc="http://schemas.openxmlformats.org/markup-compatibility/2006" xmlns:mv="urn:schemas-microsoft-com:mac:vml" xmlns:p="http://schemas.openxmlformats.org/presentationml/2006/main" mc:Ignorable="mv" mc:PreserveAttributes="mv:*" type="picTx" preserve="1">
   <p:cSld name="Picture with Caption">
     <p:spTree>
       <p:nvGrpSpPr>
@@ -2499,7 +2478,8 @@
           <a:p>
             <a:fld id="{11859447-1FF1-4571-A7A1-75F1CAF7F5D9}" type="datetime1">
               <a:rPr lang="en-US" smtClean="0"/>
-              <a:t/>
+              <a:pPr/>
+              <a:t>19/11/08</a:t>
             </a:fld>
             <a:endParaRPr lang="en-US"/>
           </a:p>
@@ -2520,10 +2500,6 @@
           <a:bodyPr/>
           <a:lstStyle/>
           <a:p>
-            <a:r>
-              <a:rPr lang="en-US" dirty="0" smtClean="0"/>
-              <a:t/>
-            </a:r>
             <a:endParaRPr lang="en-US"/>
           </a:p>
         </p:txBody>
@@ -2545,7 +2521,8 @@
           <a:p>
             <a:fld id="{763D1470-AB83-4C4C-B3B3-7F0C9DC8E8D6}" type="slidenum">
               <a:rPr lang="en-US" smtClean="0"/>
-              <a:t>&lt;numéro&gt;</a:t>
+              <a:pPr/>
+              <a:t>‹#›</a:t>
             </a:fld>
             <a:endParaRPr lang="en-US"/>
           </a:p>
@@ -2560,12 +2537,12 @@
 </file>
 
 <file path=ppt/slideMasters/slideMaster1.xml><?xml version="1.0" encoding="utf-8"?>
-<p:sldMaster xmlns:p="http://schemas.openxmlformats.org/presentationml/2006/main" xmlns:r="http://schemas.openxmlformats.org/officeDocument/2006/relationships" xmlns:a="http://schemas.openxmlformats.org/drawingml/2006/main">
+<p:sldMaster xmlns:a="http://schemas.openxmlformats.org/drawingml/2006/main" xmlns:r="http://schemas.openxmlformats.org/officeDocument/2006/relationships" xmlns:mc="http://schemas.openxmlformats.org/markup-compatibility/2006" xmlns:mv="urn:schemas-microsoft-com:mac:vml" xmlns:p="http://schemas.openxmlformats.org/presentationml/2006/main" mc:Ignorable="mv" mc:PreserveAttributes="mv:*">
   <p:cSld>
     <p:bg>
       <p:bgPr>
         <a:solidFill>
-          <a:srgbClr val="ffffff"/>
+          <a:srgbClr val="FFFFFF"/>
         </a:solidFill>
         <a:effectLst/>
       </p:bgPr>
@@ -2586,7 +2563,7 @@
       </p:grpSpPr>
       <p:sp>
         <p:nvSpPr>
-          <p:cNvPr name="Title Placeholder 1" id="2"/>
+          <p:cNvPr id="2" name="Title Placeholder 1"/>
           <p:cNvSpPr>
             <a:spLocks noGrp="1"/>
           </p:cNvSpPr>
@@ -2604,7 +2581,7 @@
           </a:prstGeom>
         </p:spPr>
         <p:txBody>
-          <a:bodyPr tIns="0" bIns="0" lIns="0" rIns="0" anchor="ctr" anchorCtr="0" wrap="square"/>
+          <a:bodyPr wrap="square" lIns="0" tIns="0" rIns="0" bIns="0" anchor="ctr" anchorCtr="0"/>
           <a:lstStyle/>
           <a:p>
             <a:r>
@@ -2617,7 +2594,7 @@
       </p:sp>
       <p:sp>
         <p:nvSpPr>
-          <p:cNvPr name="Text Placeholder 2" id="3"/>
+          <p:cNvPr id="3" name="Text Placeholder 2"/>
           <p:cNvSpPr>
             <a:spLocks noGrp="1"/>
           </p:cNvSpPr>
@@ -2635,7 +2612,7 @@
           </a:prstGeom>
         </p:spPr>
         <p:txBody>
-          <a:bodyPr tIns="0" bIns="0" lIns="0" rIns="0" anchorCtr="0" wrap="square"/>
+          <a:bodyPr wrap="square" lIns="0" tIns="0" rIns="0" bIns="0" anchorCtr="0"/>
           <a:lstStyle/>
           <a:p>
             <a:pPr lvl="0"/>
@@ -2705,7 +2682,7 @@
       </p:sp>
       <p:sp>
         <p:nvSpPr>
-          <p:cNvPr name="Date Placeholder 3" id="4"/>
+          <p:cNvPr id="4" name="Date Placeholder 3"/>
           <p:cNvSpPr>
             <a:spLocks noGrp="1"/>
           </p:cNvSpPr>
@@ -2722,27 +2699,28 @@
             <a:avLst/>
           </a:prstGeom>
           <a:solidFill>
-            <a:srgbClr val="ffffff">
+            <a:srgbClr val="FFFFFF">
               <a:alpha val="0"/>
             </a:srgbClr>
           </a:solidFill>
         </p:spPr>
         <p:txBody>
-          <a:bodyPr tIns="0" bIns="0" lIns="0" rIns="0" anchorCtr="0" wrap="square"/>
+          <a:bodyPr wrap="square" lIns="0" tIns="0" rIns="0" bIns="0" anchorCtr="0"/>
           <a:lstStyle>
             <a:lvl1pPr algn="l">
               <a:defRPr sz="1400">
                 <a:solidFill>
                   <a:srgbClr val="000000"/>
                 </a:solidFill>
-                <a:latin typeface="Times New Roman" pitchFamily="0" charset="0"/>
+                <a:latin typeface="Times New Roman" charset="0"/>
               </a:defRPr>
             </a:lvl1pPr>
           </a:lstStyle>
           <a:p>
             <a:fld id="{11859447-1FF1-4571-A7A1-75F1CAF7F5D9}" type="datetime1">
               <a:rPr lang="en-US" smtClean="0"/>
-              <a:t/>
+              <a:pPr/>
+              <a:t>19/11/08</a:t>
             </a:fld>
             <a:endParaRPr lang="en-US"/>
           </a:p>
@@ -2750,7 +2728,7 @@
       </p:sp>
       <p:sp>
         <p:nvSpPr>
-          <p:cNvPr name="Footer Placeholder 4" id="5"/>
+          <p:cNvPr id="5" name="Footer Placeholder 4"/>
           <p:cNvSpPr>
             <a:spLocks noGrp="1"/>
           </p:cNvSpPr>
@@ -2767,35 +2745,31 @@
             <a:avLst/>
           </a:prstGeom>
           <a:solidFill>
-            <a:srgbClr val="ffffff">
+            <a:srgbClr val="FFFFFF">
               <a:alpha val="0"/>
             </a:srgbClr>
           </a:solidFill>
         </p:spPr>
         <p:txBody>
-          <a:bodyPr tIns="0" bIns="0" lIns="0" rIns="0" anchorCtr="0" wrap="square"/>
+          <a:bodyPr wrap="square" lIns="0" tIns="0" rIns="0" bIns="0" anchorCtr="0"/>
           <a:lstStyle>
             <a:lvl1pPr algn="ctr">
               <a:defRPr sz="1400">
                 <a:solidFill>
                   <a:srgbClr val="000000"/>
                 </a:solidFill>
-                <a:latin typeface="Times New Roman" pitchFamily="0" charset="0"/>
+                <a:latin typeface="Times New Roman" charset="0"/>
               </a:defRPr>
             </a:lvl1pPr>
           </a:lstStyle>
           <a:p>
-            <a:r>
-              <a:rPr lang="en-US" dirty="0" smtClean="0"/>
-              <a:t/>
-            </a:r>
-            <a:endParaRPr lang="en-US"/>
-          </a:p>
-        </p:txBody>
-      </p:sp>
-      <p:sp>
-        <p:nvSpPr>
-          <p:cNvPr name="Slide Number Placeholder 5" id="6"/>
+            <a:endParaRPr lang="en-US"/>
+          </a:p>
+        </p:txBody>
+      </p:sp>
+      <p:sp>
+        <p:nvSpPr>
+          <p:cNvPr id="6" name="Slide Number Placeholder 5"/>
           <p:cNvSpPr>
             <a:spLocks noGrp="1"/>
           </p:cNvSpPr>
@@ -2812,27 +2786,28 @@
             <a:avLst/>
           </a:prstGeom>
           <a:solidFill>
-            <a:srgbClr val="ffffff">
+            <a:srgbClr val="FFFFFF">
               <a:alpha val="0"/>
             </a:srgbClr>
           </a:solidFill>
         </p:spPr>
         <p:txBody>
-          <a:bodyPr tIns="0" bIns="0" lIns="0" rIns="0" anchorCtr="0" wrap="square"/>
+          <a:bodyPr wrap="square" lIns="0" tIns="0" rIns="0" bIns="0" anchorCtr="0"/>
           <a:lstStyle>
             <a:lvl1pPr algn="r">
               <a:defRPr sz="1400">
                 <a:solidFill>
                   <a:srgbClr val="000000"/>
                 </a:solidFill>
-                <a:latin typeface="Times New Roman" pitchFamily="0" charset="0"/>
+                <a:latin typeface="Times New Roman" charset="0"/>
               </a:defRPr>
             </a:lvl1pPr>
           </a:lstStyle>
           <a:p>
             <a:fld id="{763D1470-AB83-4C4C-B3B3-7F0C9DC8E8D6}" type="slidenum">
               <a:rPr lang="en-US" smtClean="0"/>
-              <a:t>&lt;numéro&gt;</a:t>
+              <a:pPr/>
+              <a:t>‹#›</a:t>
             </a:fld>
             <a:endParaRPr lang="en-US"/>
           </a:p>
@@ -3122,13 +3097,13 @@
 </p:sldMaster>
 </file>
 
-<file path=ppt/slides/Slide1.xml><?xml version="1.0" encoding="utf-8"?>
-<p:sld xmlns:p="http://schemas.openxmlformats.org/presentationml/2006/main" xmlns:script="urn:oasis:names:tc:opendocument:xmlns:script:1.0" xmlns:r="http://schemas.openxmlformats.org/officeDocument/2006/relationships" xmlns:fo="urn:oasis:names:tc:opendocument:xmlns:xsl-fo-compatible:1.0" xmlns:svg="urn:oasis:names:tc:opendocument:xmlns:svg-compatible:1.0" xmlns:a="http://schemas.openxmlformats.org/drawingml/2006/main" xmlns:presentation="urn:oasis:names:tc:opendocument:xmlns:presentation:1.0" xmlns:xlink="http://www.w3.org/1999/xlink">
+<file path=ppt/slides/slide1.xml><?xml version="1.0" encoding="utf-8"?>
+<p:sld xmlns:a="http://schemas.openxmlformats.org/drawingml/2006/main" xmlns:r="http://schemas.openxmlformats.org/officeDocument/2006/relationships" xmlns:mc="http://schemas.openxmlformats.org/markup-compatibility/2006" xmlns:mv="urn:schemas-microsoft-com:mac:vml" xmlns:p="http://schemas.openxmlformats.org/presentationml/2006/main" mc:Ignorable="mv" mc:PreserveAttributes="mv:*">
   <p:cSld>
     <p:bg>
       <p:bgPr>
         <a:solidFill>
-          <a:srgbClr val="ffffff"/>
+          <a:srgbClr val="FFFFFF"/>
         </a:solidFill>
         <a:effectLst/>
       </p:bgPr>
@@ -3149,7 +3124,7 @@
       </p:grpSpPr>
       <p:sp>
         <p:nvSpPr>
-          <p:cNvPr name="Title 1" id="2"/>
+          <p:cNvPr id="2" name="Title 1"/>
           <p:cNvSpPr>
             <a:spLocks noGrp="1"/>
           </p:cNvSpPr>
@@ -3169,7 +3144,7 @@
           </a:solidFill>
         </p:spPr>
         <p:txBody>
-          <a:bodyPr tIns="0" bIns="0" lIns="0" rIns="0" anchorCtr="0" wrap="square"/>
+          <a:bodyPr wrap="square" lIns="0" tIns="0" rIns="0" bIns="0" anchorCtr="0"/>
           <a:lstStyle/>
           <a:p>
             <a:pPr>
@@ -3177,8 +3152,8 @@
               <a:tabLst/>
             </a:pPr>
             <a:r>
-              <a:rPr lang="en-US" smtClean="0" sz="4400">
-                <a:latin charset="0" typeface="Arial"/>
+              <a:rPr lang="en-US" sz="4400" smtClean="0">
+                <a:latin typeface="Arial" charset="0"/>
               </a:rPr>
               <a:t>My proud</a:t>
             </a:r>
@@ -3187,7 +3162,7 @@
       </p:sp>
       <p:sp>
         <p:nvSpPr>
-          <p:cNvPr name="Title 1" id="3"/>
+          <p:cNvPr id="3" name="Title 1"/>
           <p:cNvSpPr>
             <a:spLocks noGrp="1"/>
           </p:cNvSpPr>
@@ -3207,7 +3182,7 @@
           </a:solidFill>
         </p:spPr>
         <p:txBody>
-          <a:bodyPr tIns="0" bIns="0" lIns="0" rIns="0" anchorCtr="0" wrap="square"/>
+          <a:bodyPr wrap="square" lIns="0" tIns="0" rIns="0" bIns="0" anchorCtr="0"/>
           <a:lstStyle/>
           <a:p>
             <a:pPr lvl="1">
@@ -3231,13 +3206,13 @@
 </p:sld>
 </file>
 
-<file path=ppt/slides/Slide2.xml><?xml version="1.0" encoding="utf-8"?>
-<p:sld xmlns:p="http://schemas.openxmlformats.org/presentationml/2006/main" xmlns:script="urn:oasis:names:tc:opendocument:xmlns:script:1.0" xmlns:r="http://schemas.openxmlformats.org/officeDocument/2006/relationships" xmlns:fo="urn:oasis:names:tc:opendocument:xmlns:xsl-fo-compatible:1.0" xmlns:svg="urn:oasis:names:tc:opendocument:xmlns:svg-compatible:1.0" xmlns:a="http://schemas.openxmlformats.org/drawingml/2006/main" xmlns:presentation="urn:oasis:names:tc:opendocument:xmlns:presentation:1.0" xmlns:xlink="http://www.w3.org/1999/xlink">
+<file path=ppt/slides/slide2.xml><?xml version="1.0" encoding="utf-8"?>
+<p:sld xmlns:a="http://schemas.openxmlformats.org/drawingml/2006/main" xmlns:r="http://schemas.openxmlformats.org/officeDocument/2006/relationships" xmlns:mc="http://schemas.openxmlformats.org/markup-compatibility/2006" xmlns:mv="urn:schemas-microsoft-com:mac:vml" xmlns:p="http://schemas.openxmlformats.org/presentationml/2006/main" mc:Ignorable="mv" mc:PreserveAttributes="mv:*">
   <p:cSld>
     <p:bg>
       <p:bgPr>
         <a:solidFill>
-          <a:srgbClr val="ffffff"/>
+          <a:srgbClr val="FFFFFF"/>
         </a:solidFill>
         <a:effectLst/>
       </p:bgPr>
@@ -3258,7 +3233,7 @@
       </p:grpSpPr>
       <p:sp>
         <p:nvSpPr>
-          <p:cNvPr name="Title 1" id="2"/>
+          <p:cNvPr id="2" name="Title 1"/>
           <p:cNvSpPr>
             <a:spLocks noGrp="1"/>
           </p:cNvSpPr>
@@ -3278,7 +3253,7 @@
           </a:solidFill>
         </p:spPr>
         <p:txBody>
-          <a:bodyPr tIns="0" bIns="0" lIns="0" rIns="0" anchorCtr="0" wrap="square"/>
+          <a:bodyPr wrap="square" lIns="0" tIns="0" rIns="0" bIns="0" anchorCtr="0"/>
           <a:lstStyle/>
           <a:p>
             <a:pPr>
@@ -3286,8 +3261,8 @@
               <a:tabLst/>
             </a:pPr>
             <a:r>
-              <a:rPr lang="en-US" smtClean="0" sz="4400">
-                <a:latin charset="0" typeface="Arial"/>
+              <a:rPr lang="en-US" sz="4400" smtClean="0">
+                <a:latin typeface="Arial" charset="0"/>
               </a:rPr>
               <a:t>Chapter one</a:t>
             </a:r>
@@ -3296,7 +3271,7 @@
       </p:sp>
       <p:sp>
         <p:nvSpPr>
-          <p:cNvPr name="Content Placeholder 2" id="3"/>
+          <p:cNvPr id="3" name="Content Placeholder 2"/>
           <p:cNvSpPr>
             <a:spLocks noGrp="1"/>
           </p:cNvSpPr>
@@ -3316,60 +3291,72 @@
           </a:solidFill>
         </p:spPr>
         <p:txBody>
-          <a:bodyPr tIns="0" bIns="0" lIns="0" rIns="0" anchorCtr="0" wrap="square"/>
-          <a:lstStyle/>
-          <a:p>
-            <a:pPr indent="-324000" marL="432000">
+          <a:bodyPr wrap="square" lIns="0" tIns="0" rIns="0" bIns="0" anchorCtr="0"/>
+          <a:lstStyle/>
+          <a:p>
+            <a:pPr marL="432000" indent="-324000">
               <a:buSzPct val="45000"/>
               <a:buFont typeface=""/>
               <a:buChar char="•"/>
               <a:tabLst/>
             </a:pPr>
             <a:r>
-              <a:rPr lang="en-US" smtClean="0" kern="0" sz="3200">
-                <a:latin charset="0" typeface="Arial"/>
+              <a:rPr lang="fr-FR" sz="3200" kern="0" dirty="0" smtClean="0">
+                <a:latin typeface="Arial" charset="0"/>
               </a:rPr>
-              <a:t>item one</a:t>
-            </a:r>
-          </a:p>
-          <a:p>
-            <a:pPr indent="-324000" marL="432000">
+              <a:t>I</a:t>
+            </a:r>
+            <a:r>
+              <a:rPr lang="en-US" sz="3200" kern="0" smtClean="0">
+                <a:latin typeface="Arial" charset="0"/>
+              </a:rPr>
+              <a:t>tem </a:t>
+            </a:r>
+            <a:r>
+              <a:rPr lang="en-US" sz="3200" kern="0" dirty="0" smtClean="0">
+                <a:latin typeface="Arial" charset="0"/>
+              </a:rPr>
+              <a:t>one</a:t>
+            </a:r>
+          </a:p>
+          <a:p>
+            <a:pPr marL="432000" indent="-324000">
               <a:buSzPct val="45000"/>
               <a:buFont typeface=""/>
               <a:buChar char="•"/>
               <a:tabLst/>
             </a:pPr>
             <a:r>
-              <a:rPr lang="en-US" smtClean="0" kern="0" sz="3200">
-                <a:latin charset="0" typeface="Arial"/>
+              <a:rPr lang="en-US" sz="3200" kern="0" dirty="0" smtClean="0">
+                <a:latin typeface="Arial" charset="0"/>
               </a:rPr>
               <a:t>item two</a:t>
             </a:r>
           </a:p>
           <a:p>
-            <a:pPr indent="-324000" marL="432000">
+            <a:pPr marL="432000" indent="-324000">
               <a:buSzPct val="45000"/>
               <a:buFont typeface=""/>
               <a:buChar char="•"/>
               <a:tabLst/>
             </a:pPr>
             <a:r>
-              <a:rPr lang="en-US" smtClean="0" kern="0" sz="3200">
-                <a:latin charset="0" typeface="Arial"/>
+              <a:rPr lang="en-US" sz="3200" kern="0" dirty="0" smtClean="0">
+                <a:latin typeface="Arial" charset="0"/>
               </a:rPr>
               <a:t>item three</a:t>
             </a:r>
           </a:p>
           <a:p>
-            <a:pPr indent="-324000" marL="432000">
+            <a:pPr marL="432000" indent="-324000">
               <a:buSzPct val="45000"/>
               <a:buFont typeface=""/>
               <a:buChar char="•"/>
               <a:tabLst/>
             </a:pPr>
             <a:r>
-              <a:rPr lang="en-US" smtClean="0" kern="0" sz="3200">
-                <a:latin charset="0" typeface="Arial"/>
+              <a:rPr lang="en-US" sz="3200" kern="0" dirty="0" smtClean="0">
+                <a:latin typeface="Arial" charset="0"/>
               </a:rPr>
               <a:t>item four</a:t>
             </a:r>

</xml_diff>

<commit_message>
New test case that shows that words which style is changed at midword are returned cut in two parts.
</commit_message>
<xml_diff>
--- a/tests/in/presentation1.pptx
+++ b/tests/in/presentation1.pptx
@@ -290,7 +290,7 @@
             <a:fld id="{11859447-1FF1-4571-A7A1-75F1CAF7F5D9}" type="datetime1">
               <a:rPr lang="en-US" smtClean="0"/>
               <a:pPr/>
-              <a:t>19/11/08</a:t>
+              <a:t>28/06/09</a:t>
             </a:fld>
             <a:endParaRPr lang="en-US"/>
           </a:p>
@@ -457,7 +457,7 @@
             <a:fld id="{11859447-1FF1-4571-A7A1-75F1CAF7F5D9}" type="datetime1">
               <a:rPr lang="en-US" smtClean="0"/>
               <a:pPr/>
-              <a:t>19/11/08</a:t>
+              <a:t>28/06/09</a:t>
             </a:fld>
             <a:endParaRPr lang="en-US"/>
           </a:p>
@@ -634,7 +634,7 @@
             <a:fld id="{11859447-1FF1-4571-A7A1-75F1CAF7F5D9}" type="datetime1">
               <a:rPr lang="en-US" smtClean="0"/>
               <a:pPr/>
-              <a:t>19/11/08</a:t>
+              <a:t>28/06/09</a:t>
             </a:fld>
             <a:endParaRPr lang="en-US"/>
           </a:p>
@@ -801,7 +801,7 @@
             <a:fld id="{11859447-1FF1-4571-A7A1-75F1CAF7F5D9}" type="datetime1">
               <a:rPr lang="en-US" smtClean="0"/>
               <a:pPr/>
-              <a:t>19/11/08</a:t>
+              <a:t>28/06/09</a:t>
             </a:fld>
             <a:endParaRPr lang="en-US"/>
           </a:p>
@@ -1044,7 +1044,7 @@
             <a:fld id="{11859447-1FF1-4571-A7A1-75F1CAF7F5D9}" type="datetime1">
               <a:rPr lang="en-US" smtClean="0"/>
               <a:pPr/>
-              <a:t>19/11/08</a:t>
+              <a:t>28/06/09</a:t>
             </a:fld>
             <a:endParaRPr lang="en-US"/>
           </a:p>
@@ -1329,7 +1329,7 @@
             <a:fld id="{11859447-1FF1-4571-A7A1-75F1CAF7F5D9}" type="datetime1">
               <a:rPr lang="en-US" smtClean="0"/>
               <a:pPr/>
-              <a:t>19/11/08</a:t>
+              <a:t>28/06/09</a:t>
             </a:fld>
             <a:endParaRPr lang="en-US"/>
           </a:p>
@@ -1748,7 +1748,7 @@
             <a:fld id="{11859447-1FF1-4571-A7A1-75F1CAF7F5D9}" type="datetime1">
               <a:rPr lang="en-US" smtClean="0"/>
               <a:pPr/>
-              <a:t>19/11/08</a:t>
+              <a:t>28/06/09</a:t>
             </a:fld>
             <a:endParaRPr lang="en-US"/>
           </a:p>
@@ -1863,7 +1863,7 @@
             <a:fld id="{11859447-1FF1-4571-A7A1-75F1CAF7F5D9}" type="datetime1">
               <a:rPr lang="en-US" smtClean="0"/>
               <a:pPr/>
-              <a:t>19/11/08</a:t>
+              <a:t>28/06/09</a:t>
             </a:fld>
             <a:endParaRPr lang="en-US"/>
           </a:p>
@@ -1955,7 +1955,7 @@
             <a:fld id="{11859447-1FF1-4571-A7A1-75F1CAF7F5D9}" type="datetime1">
               <a:rPr lang="en-US" smtClean="0"/>
               <a:pPr/>
-              <a:t>19/11/08</a:t>
+              <a:t>28/06/09</a:t>
             </a:fld>
             <a:endParaRPr lang="en-US"/>
           </a:p>
@@ -2229,7 +2229,7 @@
             <a:fld id="{11859447-1FF1-4571-A7A1-75F1CAF7F5D9}" type="datetime1">
               <a:rPr lang="en-US" smtClean="0"/>
               <a:pPr/>
-              <a:t>19/11/08</a:t>
+              <a:t>28/06/09</a:t>
             </a:fld>
             <a:endParaRPr lang="en-US"/>
           </a:p>
@@ -2479,7 +2479,7 @@
             <a:fld id="{11859447-1FF1-4571-A7A1-75F1CAF7F5D9}" type="datetime1">
               <a:rPr lang="en-US" smtClean="0"/>
               <a:pPr/>
-              <a:t>19/11/08</a:t>
+              <a:t>28/06/09</a:t>
             </a:fld>
             <a:endParaRPr lang="en-US"/>
           </a:p>
@@ -2720,7 +2720,7 @@
             <a:fld id="{11859447-1FF1-4571-A7A1-75F1CAF7F5D9}" type="datetime1">
               <a:rPr lang="en-US" smtClean="0"/>
               <a:pPr/>
-              <a:t>19/11/08</a:t>
+              <a:t>28/06/09</a:t>
             </a:fld>
             <a:endParaRPr lang="en-US"/>
           </a:p>
@@ -3307,17 +3307,44 @@
               <a:t>I</a:t>
             </a:r>
             <a:r>
-              <a:rPr lang="en-US" sz="3200" kern="0" smtClean="0">
-                <a:latin typeface="Arial" charset="0"/>
-              </a:rPr>
-              <a:t>tem </a:t>
-            </a:r>
-            <a:r>
               <a:rPr lang="en-US" sz="3200" kern="0" dirty="0" smtClean="0">
                 <a:latin typeface="Arial" charset="0"/>
               </a:rPr>
-              <a:t>one</a:t>
-            </a:r>
+              <a:t>t</a:t>
+            </a:r>
+            <a:r>
+              <a:rPr lang="en-US" sz="3200" b="1" kern="0" dirty="0" smtClean="0">
+                <a:latin typeface="Arial" charset="0"/>
+              </a:rPr>
+              <a:t>em</a:t>
+            </a:r>
+            <a:r>
+              <a:rPr lang="en-US" sz="3200" kern="0" dirty="0" smtClean="0">
+                <a:latin typeface="Arial" charset="0"/>
+              </a:rPr>
+              <a:t> </a:t>
+            </a:r>
+            <a:r>
+              <a:rPr lang="en-US" sz="3200" kern="0" dirty="0" smtClean="0">
+                <a:latin typeface="Arial" charset="0"/>
+              </a:rPr>
+              <a:t>one </a:t>
+            </a:r>
+            <a:r>
+              <a:rPr lang="en-US" sz="3200" kern="0" dirty="0" err="1" smtClean="0">
+                <a:latin typeface="Arial" charset="0"/>
+              </a:rPr>
+              <a:t>mid</a:t>
+            </a:r>
+            <a:r>
+              <a:rPr lang="en-US" sz="3200" b="1" kern="0" dirty="0" err="1" smtClean="0">
+                <a:latin typeface="Arial" charset="0"/>
+              </a:rPr>
+              <a:t>word</a:t>
+            </a:r>
+            <a:endParaRPr lang="en-US" sz="3200" b="1" kern="0" dirty="0" smtClean="0">
+              <a:latin typeface="Arial" charset="0"/>
+            </a:endParaRPr>
           </a:p>
           <a:p>
             <a:pPr marL="432000" indent="-324000">

</xml_diff>